<commit_message>
Simple Sentiment Analyzer made
</commit_message>
<xml_diff>
--- a/PPT/pres_k1.pptx
+++ b/PPT/pres_k1.pptx
@@ -3742,10 +3742,10 @@
                 <a:ea typeface="Arial Unicode MS" panose="020B0604020202020204" pitchFamily="34" charset="-128"/>
                 <a:cs typeface="Arial Unicode MS" panose="020B0604020202020204" pitchFamily="34" charset="-128"/>
               </a:rPr>
-              <a:t>Noun-Verb  relation, </a:t>
-            </a:r>
-            <a:r>
-              <a:rPr lang="en-US" dirty="0" err="1" smtClean="0">
+              <a:t>Noun-Verb  relation</a:t>
+            </a:r>
+            <a:r>
+              <a:rPr lang="en-US" smtClean="0">
                 <a:solidFill>
                   <a:schemeClr val="accent3">
                     <a:lumMod val="20000"/>
@@ -3756,7 +3756,21 @@
                 <a:ea typeface="Arial Unicode MS" panose="020B0604020202020204" pitchFamily="34" charset="-128"/>
                 <a:cs typeface="Arial Unicode MS" panose="020B0604020202020204" pitchFamily="34" charset="-128"/>
               </a:rPr>
-              <a:t>Seperation</a:t>
+              <a:t>, </a:t>
+            </a:r>
+            <a:r>
+              <a:rPr lang="en-US" smtClean="0">
+                <a:solidFill>
+                  <a:schemeClr val="accent3">
+                    <a:lumMod val="20000"/>
+                    <a:lumOff val="80000"/>
+                  </a:schemeClr>
+                </a:solidFill>
+                <a:latin typeface="Arial Unicode MS" panose="020B0604020202020204" pitchFamily="34" charset="-128"/>
+                <a:ea typeface="Arial Unicode MS" panose="020B0604020202020204" pitchFamily="34" charset="-128"/>
+                <a:cs typeface="Arial Unicode MS" panose="020B0604020202020204" pitchFamily="34" charset="-128"/>
+              </a:rPr>
+              <a:t>Separation </a:t>
             </a:r>
             <a:r>
               <a:rPr lang="en-US" dirty="0" smtClean="0">
@@ -3770,7 +3784,7 @@
                 <a:ea typeface="Arial Unicode MS" panose="020B0604020202020204" pitchFamily="34" charset="-128"/>
                 <a:cs typeface="Arial Unicode MS" panose="020B0604020202020204" pitchFamily="34" charset="-128"/>
               </a:rPr>
-              <a:t> of Clauses</a:t>
+              <a:t>of Clauses</a:t>
             </a:r>
           </a:p>
           <a:p>

</xml_diff>

<commit_message>
Adding custom SA to website
</commit_message>
<xml_diff>
--- a/PPT/pres_k1.pptx
+++ b/PPT/pres_k1.pptx
@@ -326,7 +326,7 @@
           <a:p>
             <a:fld id="{397856E5-BB43-4EC0-8CF1-1A7BA0521439}" type="datetimeFigureOut">
               <a:rPr lang="en-US" smtClean="0"/>
-              <a:t>7/16/2014</a:t>
+              <a:t>7/23/2014</a:t>
             </a:fld>
             <a:endParaRPr lang="en-US"/>
           </a:p>
@@ -513,7 +513,7 @@
           <a:p>
             <a:fld id="{397856E5-BB43-4EC0-8CF1-1A7BA0521439}" type="datetimeFigureOut">
               <a:rPr lang="en-US" smtClean="0"/>
-              <a:t>7/16/2014</a:t>
+              <a:t>7/23/2014</a:t>
             </a:fld>
             <a:endParaRPr lang="en-US"/>
           </a:p>
@@ -688,7 +688,7 @@
           <a:p>
             <a:fld id="{397856E5-BB43-4EC0-8CF1-1A7BA0521439}" type="datetimeFigureOut">
               <a:rPr lang="en-US" smtClean="0"/>
-              <a:t>7/16/2014</a:t>
+              <a:t>7/23/2014</a:t>
             </a:fld>
             <a:endParaRPr lang="en-US"/>
           </a:p>
@@ -868,7 +868,7 @@
           <a:p>
             <a:fld id="{397856E5-BB43-4EC0-8CF1-1A7BA0521439}" type="datetimeFigureOut">
               <a:rPr lang="en-US" smtClean="0"/>
-              <a:t>7/16/2014</a:t>
+              <a:t>7/23/2014</a:t>
             </a:fld>
             <a:endParaRPr lang="en-US"/>
           </a:p>
@@ -1115,7 +1115,7 @@
           <a:p>
             <a:fld id="{397856E5-BB43-4EC0-8CF1-1A7BA0521439}" type="datetimeFigureOut">
               <a:rPr lang="en-US" smtClean="0"/>
-              <a:t>7/16/2014</a:t>
+              <a:t>7/23/2014</a:t>
             </a:fld>
             <a:endParaRPr lang="en-US"/>
           </a:p>
@@ -1589,7 +1589,7 @@
           <a:p>
             <a:fld id="{397856E5-BB43-4EC0-8CF1-1A7BA0521439}" type="datetimeFigureOut">
               <a:rPr lang="en-US" smtClean="0"/>
-              <a:t>7/16/2014</a:t>
+              <a:t>7/23/2014</a:t>
             </a:fld>
             <a:endParaRPr lang="en-US"/>
           </a:p>
@@ -2004,7 +2004,7 @@
           <a:p>
             <a:fld id="{397856E5-BB43-4EC0-8CF1-1A7BA0521439}" type="datetimeFigureOut">
               <a:rPr lang="en-US" smtClean="0"/>
-              <a:t>7/16/2014</a:t>
+              <a:t>7/23/2014</a:t>
             </a:fld>
             <a:endParaRPr lang="en-US"/>
           </a:p>
@@ -2135,7 +2135,7 @@
           <a:p>
             <a:fld id="{397856E5-BB43-4EC0-8CF1-1A7BA0521439}" type="datetimeFigureOut">
               <a:rPr lang="en-US" smtClean="0"/>
-              <a:t>7/16/2014</a:t>
+              <a:t>7/23/2014</a:t>
             </a:fld>
             <a:endParaRPr lang="en-US"/>
           </a:p>
@@ -2230,7 +2230,7 @@
           <a:p>
             <a:fld id="{397856E5-BB43-4EC0-8CF1-1A7BA0521439}" type="datetimeFigureOut">
               <a:rPr lang="en-US" smtClean="0"/>
-              <a:t>7/16/2014</a:t>
+              <a:t>7/23/2014</a:t>
             </a:fld>
             <a:endParaRPr lang="en-US"/>
           </a:p>
@@ -2508,7 +2508,7 @@
           <a:p>
             <a:fld id="{397856E5-BB43-4EC0-8CF1-1A7BA0521439}" type="datetimeFigureOut">
               <a:rPr lang="en-US" smtClean="0"/>
-              <a:t>7/16/2014</a:t>
+              <a:t>7/23/2014</a:t>
             </a:fld>
             <a:endParaRPr lang="en-US"/>
           </a:p>
@@ -2760,7 +2760,7 @@
           <a:p>
             <a:fld id="{397856E5-BB43-4EC0-8CF1-1A7BA0521439}" type="datetimeFigureOut">
               <a:rPr lang="en-US" smtClean="0"/>
-              <a:t>7/16/2014</a:t>
+              <a:t>7/23/2014</a:t>
             </a:fld>
             <a:endParaRPr lang="en-US"/>
           </a:p>
@@ -3132,7 +3132,7 @@
           <a:p>
             <a:fld id="{397856E5-BB43-4EC0-8CF1-1A7BA0521439}" type="datetimeFigureOut">
               <a:rPr lang="en-US" smtClean="0"/>
-              <a:t>7/16/2014</a:t>
+              <a:t>7/23/2014</a:t>
             </a:fld>
             <a:endParaRPr lang="en-US"/>
           </a:p>
@@ -3599,7 +3599,7 @@
         </p:spPr>
         <p:txBody>
           <a:bodyPr>
-            <a:normAutofit fontScale="85000" lnSpcReduction="20000"/>
+            <a:normAutofit lnSpcReduction="10000"/>
           </a:bodyPr>
           <a:lstStyle/>
           <a:p>
@@ -3639,7 +3639,7 @@
                 <a:ea typeface="Arial Unicode MS" panose="020B0604020202020204" pitchFamily="34" charset="-128"/>
                 <a:cs typeface="Arial Unicode MS" panose="020B0604020202020204" pitchFamily="34" charset="-128"/>
               </a:rPr>
-              <a:t>Tokenizing, Tagging</a:t>
+              <a:t>Word-Tokenizing</a:t>
             </a:r>
           </a:p>
           <a:p>
@@ -3664,17 +3664,6 @@
               </a:rPr>
               <a:t>Negation and other flag-attachment</a:t>
             </a:r>
-            <a:endParaRPr lang="en-US" dirty="0" smtClean="0">
-              <a:solidFill>
-                <a:schemeClr val="accent3">
-                  <a:lumMod val="20000"/>
-                  <a:lumOff val="80000"/>
-                </a:schemeClr>
-              </a:solidFill>
-              <a:latin typeface="Arial Unicode MS" panose="020B0604020202020204" pitchFamily="34" charset="-128"/>
-              <a:ea typeface="Arial Unicode MS" panose="020B0604020202020204" pitchFamily="34" charset="-128"/>
-              <a:cs typeface="Arial Unicode MS" panose="020B0604020202020204" pitchFamily="34" charset="-128"/>
-            </a:endParaRPr>
           </a:p>
           <a:p>
             <a:pPr marL="514350" indent="-514350" algn="l">
@@ -3719,105 +3708,8 @@
                 <a:ea typeface="Arial Unicode MS" panose="020B0604020202020204" pitchFamily="34" charset="-128"/>
                 <a:cs typeface="Arial Unicode MS" panose="020B0604020202020204" pitchFamily="34" charset="-128"/>
               </a:rPr>
-              <a:t>Parsing – Chunking </a:t>
-            </a:r>
-          </a:p>
-          <a:p>
-            <a:pPr marL="514350" indent="-514350" algn="l">
-              <a:buClr>
-                <a:schemeClr val="accent4"/>
-              </a:buClr>
-              <a:buFont typeface="+mj-lt"/>
-              <a:buAutoNum type="alphaLcPeriod"/>
-            </a:pPr>
-            <a:r>
-              <a:rPr lang="en-US" dirty="0" smtClean="0">
-                <a:solidFill>
-                  <a:schemeClr val="accent3">
-                    <a:lumMod val="20000"/>
-                    <a:lumOff val="80000"/>
-                  </a:schemeClr>
-                </a:solidFill>
-                <a:latin typeface="Arial Unicode MS" panose="020B0604020202020204" pitchFamily="34" charset="-128"/>
-                <a:ea typeface="Arial Unicode MS" panose="020B0604020202020204" pitchFamily="34" charset="-128"/>
-                <a:cs typeface="Arial Unicode MS" panose="020B0604020202020204" pitchFamily="34" charset="-128"/>
-              </a:rPr>
-              <a:t>Noun-Verb  relation</a:t>
-            </a:r>
-            <a:r>
-              <a:rPr lang="en-US" smtClean="0">
-                <a:solidFill>
-                  <a:schemeClr val="accent3">
-                    <a:lumMod val="20000"/>
-                    <a:lumOff val="80000"/>
-                  </a:schemeClr>
-                </a:solidFill>
-                <a:latin typeface="Arial Unicode MS" panose="020B0604020202020204" pitchFamily="34" charset="-128"/>
-                <a:ea typeface="Arial Unicode MS" panose="020B0604020202020204" pitchFamily="34" charset="-128"/>
-                <a:cs typeface="Arial Unicode MS" panose="020B0604020202020204" pitchFamily="34" charset="-128"/>
-              </a:rPr>
-              <a:t>, </a:t>
-            </a:r>
-            <a:r>
-              <a:rPr lang="en-US" smtClean="0">
-                <a:solidFill>
-                  <a:schemeClr val="accent3">
-                    <a:lumMod val="20000"/>
-                    <a:lumOff val="80000"/>
-                  </a:schemeClr>
-                </a:solidFill>
-                <a:latin typeface="Arial Unicode MS" panose="020B0604020202020204" pitchFamily="34" charset="-128"/>
-                <a:ea typeface="Arial Unicode MS" panose="020B0604020202020204" pitchFamily="34" charset="-128"/>
-                <a:cs typeface="Arial Unicode MS" panose="020B0604020202020204" pitchFamily="34" charset="-128"/>
-              </a:rPr>
-              <a:t>Separation </a:t>
-            </a:r>
-            <a:r>
-              <a:rPr lang="en-US" dirty="0" smtClean="0">
-                <a:solidFill>
-                  <a:schemeClr val="accent3">
-                    <a:lumMod val="20000"/>
-                    <a:lumOff val="80000"/>
-                  </a:schemeClr>
-                </a:solidFill>
-                <a:latin typeface="Arial Unicode MS" panose="020B0604020202020204" pitchFamily="34" charset="-128"/>
-                <a:ea typeface="Arial Unicode MS" panose="020B0604020202020204" pitchFamily="34" charset="-128"/>
-                <a:cs typeface="Arial Unicode MS" panose="020B0604020202020204" pitchFamily="34" charset="-128"/>
-              </a:rPr>
-              <a:t>of Clauses</a:t>
-            </a:r>
-          </a:p>
-          <a:p>
-            <a:pPr marL="514350" indent="-514350" algn="l">
-              <a:buClr>
-                <a:schemeClr val="accent4"/>
-              </a:buClr>
-              <a:buFont typeface="+mj-lt"/>
-              <a:buAutoNum type="alphaLcPeriod"/>
-            </a:pPr>
-            <a:r>
-              <a:rPr lang="en-US" dirty="0" smtClean="0">
-                <a:solidFill>
-                  <a:schemeClr val="accent3">
-                    <a:lumMod val="20000"/>
-                    <a:lumOff val="80000"/>
-                  </a:schemeClr>
-                </a:solidFill>
-                <a:latin typeface="Arial Unicode MS" panose="020B0604020202020204" pitchFamily="34" charset="-128"/>
-                <a:ea typeface="Arial Unicode MS" panose="020B0604020202020204" pitchFamily="34" charset="-128"/>
-                <a:cs typeface="Arial Unicode MS" panose="020B0604020202020204" pitchFamily="34" charset="-128"/>
-              </a:rPr>
-              <a:t>Sentence level sentiment .. Added to paragraph level</a:t>
-            </a:r>
-          </a:p>
-          <a:p>
-            <a:pPr marL="514350" indent="-514350" algn="l">
-              <a:buClr>
-                <a:schemeClr val="accent4"/>
-              </a:buClr>
-              <a:buFont typeface="+mj-lt"/>
-              <a:buAutoNum type="alphaLcPeriod"/>
-            </a:pPr>
+              <a:t>Sentence level sentiment – </a:t>
+            </a:r>
             <a:r>
               <a:rPr lang="en-US" dirty="0" smtClean="0">
                 <a:solidFill>
@@ -3832,9 +3724,6 @@
               </a:rPr>
               <a:t>Summing everything up</a:t>
             </a:r>
-          </a:p>
-          <a:p>
-            <a:pPr algn="l"/>
             <a:endParaRPr lang="en-US" dirty="0" smtClean="0"/>
           </a:p>
           <a:p>
@@ -3862,7 +3751,7 @@
         <p:spPr>
           <a:xfrm>
             <a:off x="381000" y="1066800"/>
-            <a:ext cx="2667000" cy="3693319"/>
+            <a:ext cx="2667000" cy="3970318"/>
           </a:xfrm>
           <a:prstGeom prst="rect">
             <a:avLst/>
@@ -3887,7 +3776,7 @@
             </a:pPr>
             <a:r>
               <a:rPr lang="en-US" dirty="0" smtClean="0"/>
-              <a:t>Paragraph-level sentiment </a:t>
+              <a:t>Negation is considered </a:t>
             </a:r>
           </a:p>
           <a:p>
@@ -3897,7 +3786,11 @@
             </a:pPr>
             <a:r>
               <a:rPr lang="en-US" dirty="0" smtClean="0"/>
-              <a:t>Negation is considered </a:t>
+              <a:t>All Capitals word has more </a:t>
+            </a:r>
+            <a:r>
+              <a:rPr lang="en-US" dirty="0" smtClean="0"/>
+              <a:t>weight</a:t>
             </a:r>
           </a:p>
           <a:p>
@@ -3907,11 +3800,7 @@
             </a:pPr>
             <a:r>
               <a:rPr lang="en-US" dirty="0" smtClean="0"/>
-              <a:t>All Capitals word has more </a:t>
-            </a:r>
-            <a:r>
-              <a:rPr lang="en-US" dirty="0" smtClean="0"/>
-              <a:t>weight</a:t>
+              <a:t>Intensifiers</a:t>
             </a:r>
           </a:p>
           <a:p>
@@ -3921,17 +3810,23 @@
             </a:pPr>
             <a:r>
               <a:rPr lang="en-US" dirty="0" smtClean="0"/>
-              <a:t>Increments </a:t>
-            </a:r>
-            <a:r>
-              <a:rPr lang="en-US" dirty="0"/>
-              <a:t>and </a:t>
-            </a:r>
+              <a:t>Lexicon-based</a:t>
+            </a:r>
+          </a:p>
+          <a:p>
+            <a:pPr marL="285750" indent="-285750">
+              <a:buFont typeface="Wingdings" panose="05000000000000000000" pitchFamily="2" charset="2"/>
+              <a:buChar char="Ø"/>
+            </a:pPr>
             <a:r>
               <a:rPr lang="en-US" dirty="0" smtClean="0"/>
-              <a:t>Decrements</a:t>
-            </a:r>
-            <a:endParaRPr lang="en-US" dirty="0"/>
+              <a:t>Internet slangs </a:t>
+            </a:r>
+            <a:r>
+              <a:rPr lang="en-US" smtClean="0"/>
+              <a:t>and Emoticons considered </a:t>
+            </a:r>
+            <a:endParaRPr lang="en-US" dirty="0" smtClean="0"/>
           </a:p>
           <a:p>
             <a:pPr marL="285750" indent="-285750">
@@ -3972,7 +3867,7 @@
         <p:spPr>
           <a:xfrm>
             <a:off x="4191000" y="1103614"/>
-            <a:ext cx="4876800" cy="1754326"/>
+            <a:ext cx="4876800" cy="1477328"/>
           </a:xfrm>
           <a:prstGeom prst="rect">
             <a:avLst/>
@@ -4031,20 +3926,6 @@
             </a:r>
           </a:p>
           <a:p>
-            <a:pPr marL="285750" indent="-285750">
-              <a:buFont typeface="Wingdings" panose="05000000000000000000" pitchFamily="2" charset="2"/>
-              <a:buChar char="v"/>
-            </a:pPr>
-            <a:r>
-              <a:rPr lang="en-US" dirty="0" err="1" smtClean="0"/>
-              <a:t>StatParser</a:t>
-            </a:r>
-            <a:r>
-              <a:rPr lang="en-US" dirty="0" smtClean="0"/>
-              <a:t> – for parsing </a:t>
-            </a:r>
-          </a:p>
-          <a:p>
             <a:endParaRPr lang="en-US" dirty="0"/>
           </a:p>
         </p:txBody>
@@ -4058,7 +3939,7 @@
         <p:spPr>
           <a:xfrm>
             <a:off x="325272" y="3929122"/>
-            <a:ext cx="3048000" cy="2031325"/>
+            <a:ext cx="3048000" cy="2308324"/>
           </a:xfrm>
           <a:prstGeom prst="rect">
             <a:avLst/>
@@ -4091,11 +3972,7 @@
             </a:r>
             <a:r>
               <a:rPr lang="en-US" dirty="0" smtClean="0"/>
-              <a:t>-Verb </a:t>
-            </a:r>
-            <a:r>
-              <a:rPr lang="en-US" dirty="0" smtClean="0"/>
-              <a:t>relation has scope to improve</a:t>
+              <a:t>-Verb relation has scope to improve</a:t>
             </a:r>
           </a:p>
           <a:p>
@@ -4105,7 +3982,7 @@
             </a:pPr>
             <a:r>
               <a:rPr lang="en-US" dirty="0" smtClean="0"/>
-              <a:t>Conjunction testing  </a:t>
+              <a:t>Conjunction testing   </a:t>
             </a:r>
           </a:p>
           <a:p>
@@ -4115,7 +3992,7 @@
             </a:pPr>
             <a:r>
               <a:rPr lang="en-US" dirty="0" smtClean="0"/>
-              <a:t>Normalization </a:t>
+              <a:t>Using Maximum Entropy Classifiers</a:t>
             </a:r>
           </a:p>
           <a:p>

</xml_diff>